<commit_message>
Shortcut og powerpoint update
</commit_message>
<xml_diff>
--- a/Kicad PCB.pptx
+++ b/Kicad PCB.pptx
@@ -7,9 +7,9 @@
   <p:sldIdLst>
     <p:sldId id="257" r:id="rId2"/>
     <p:sldId id="258" r:id="rId3"/>
-    <p:sldId id="260" r:id="rId4"/>
-    <p:sldId id="259" r:id="rId5"/>
-    <p:sldId id="261" r:id="rId6"/>
+    <p:sldId id="261" r:id="rId4"/>
+    <p:sldId id="260" r:id="rId5"/>
+    <p:sldId id="259" r:id="rId6"/>
     <p:sldId id="262" r:id="rId7"/>
     <p:sldId id="263" r:id="rId8"/>
     <p:sldId id="266" r:id="rId9"/>
@@ -291,7 +291,7 @@
           <a:p>
             <a:fld id="{48A87A34-81AB-432B-8DAE-1953F412C126}" type="datetimeFigureOut">
               <a:rPr lang="en-US" smtClean="0"/>
-              <a:t>2/16/2021</a:t>
+              <a:t>2/20/2021</a:t>
             </a:fld>
             <a:endParaRPr lang="en-US" dirty="0"/>
           </a:p>
@@ -559,7 +559,7 @@
             <a:fld id="{48A87A34-81AB-432B-8DAE-1953F412C126}" type="datetimeFigureOut">
               <a:rPr lang="en-US" smtClean="0"/>
               <a:pPr/>
-              <a:t>2/16/2021</a:t>
+              <a:t>2/20/2021</a:t>
             </a:fld>
             <a:endParaRPr lang="en-US" dirty="0"/>
           </a:p>
@@ -792,7 +792,7 @@
             <a:fld id="{48A87A34-81AB-432B-8DAE-1953F412C126}" type="datetimeFigureOut">
               <a:rPr lang="en-US" smtClean="0"/>
               <a:pPr/>
-              <a:t>2/16/2021</a:t>
+              <a:t>2/20/2021</a:t>
             </a:fld>
             <a:endParaRPr lang="en-US" dirty="0"/>
           </a:p>
@@ -1104,7 +1104,7 @@
             <a:fld id="{48A87A34-81AB-432B-8DAE-1953F412C126}" type="datetimeFigureOut">
               <a:rPr lang="en-US" smtClean="0"/>
               <a:pPr/>
-              <a:t>2/16/2021</a:t>
+              <a:t>2/20/2021</a:t>
             </a:fld>
             <a:endParaRPr lang="en-US" dirty="0"/>
           </a:p>
@@ -1579,7 +1579,7 @@
             <a:fld id="{48A87A34-81AB-432B-8DAE-1953F412C126}" type="datetimeFigureOut">
               <a:rPr lang="en-US" smtClean="0"/>
               <a:pPr/>
-              <a:t>2/16/2021</a:t>
+              <a:t>2/20/2021</a:t>
             </a:fld>
             <a:endParaRPr lang="en-US" dirty="0"/>
           </a:p>
@@ -2128,7 +2128,7 @@
             <a:fld id="{48A87A34-81AB-432B-8DAE-1953F412C126}" type="datetimeFigureOut">
               <a:rPr lang="en-US" smtClean="0"/>
               <a:pPr/>
-              <a:t>2/16/2021</a:t>
+              <a:t>2/20/2021</a:t>
             </a:fld>
             <a:endParaRPr lang="en-US" dirty="0"/>
           </a:p>
@@ -2904,7 +2904,7 @@
             <a:fld id="{48A87A34-81AB-432B-8DAE-1953F412C126}" type="datetimeFigureOut">
               <a:rPr lang="en-US" smtClean="0"/>
               <a:pPr/>
-              <a:t>2/16/2021</a:t>
+              <a:t>2/20/2021</a:t>
             </a:fld>
             <a:endParaRPr lang="en-US" dirty="0"/>
           </a:p>
@@ -3080,7 +3080,7 @@
           <a:p>
             <a:fld id="{48A87A34-81AB-432B-8DAE-1953F412C126}" type="datetimeFigureOut">
               <a:rPr lang="en-US" smtClean="0"/>
-              <a:t>2/16/2021</a:t>
+              <a:t>2/20/2021</a:t>
             </a:fld>
             <a:endParaRPr lang="en-US" dirty="0"/>
           </a:p>
@@ -3303,7 +3303,7 @@
           <a:p>
             <a:fld id="{48A87A34-81AB-432B-8DAE-1953F412C126}" type="datetimeFigureOut">
               <a:rPr lang="en-US" smtClean="0"/>
-              <a:t>2/16/2021</a:t>
+              <a:t>2/20/2021</a:t>
             </a:fld>
             <a:endParaRPr lang="en-US" dirty="0"/>
           </a:p>
@@ -3483,7 +3483,7 @@
           <a:p>
             <a:fld id="{48A87A34-81AB-432B-8DAE-1953F412C126}" type="datetimeFigureOut">
               <a:rPr lang="en-US" smtClean="0"/>
-              <a:t>2/16/2021</a:t>
+              <a:t>2/20/2021</a:t>
             </a:fld>
             <a:endParaRPr lang="en-US" dirty="0"/>
           </a:p>
@@ -3772,7 +3772,7 @@
           <a:p>
             <a:fld id="{48A87A34-81AB-432B-8DAE-1953F412C126}" type="datetimeFigureOut">
               <a:rPr lang="en-US" smtClean="0"/>
-              <a:t>2/16/2021</a:t>
+              <a:t>2/20/2021</a:t>
             </a:fld>
             <a:endParaRPr lang="en-US" dirty="0"/>
           </a:p>
@@ -4014,7 +4014,7 @@
           <a:p>
             <a:fld id="{48A87A34-81AB-432B-8DAE-1953F412C126}" type="datetimeFigureOut">
               <a:rPr lang="en-US" smtClean="0"/>
-              <a:t>2/16/2021</a:t>
+              <a:t>2/20/2021</a:t>
             </a:fld>
             <a:endParaRPr lang="en-US" dirty="0"/>
           </a:p>
@@ -4393,7 +4393,7 @@
           <a:p>
             <a:fld id="{48A87A34-81AB-432B-8DAE-1953F412C126}" type="datetimeFigureOut">
               <a:rPr lang="en-US" smtClean="0"/>
-              <a:t>2/16/2021</a:t>
+              <a:t>2/20/2021</a:t>
             </a:fld>
             <a:endParaRPr lang="en-US" dirty="0"/>
           </a:p>
@@ -4511,7 +4511,7 @@
           <a:p>
             <a:fld id="{48A87A34-81AB-432B-8DAE-1953F412C126}" type="datetimeFigureOut">
               <a:rPr lang="en-US" smtClean="0"/>
-              <a:t>2/16/2021</a:t>
+              <a:t>2/20/2021</a:t>
             </a:fld>
             <a:endParaRPr lang="en-US" dirty="0"/>
           </a:p>
@@ -4606,7 +4606,7 @@
           <a:p>
             <a:fld id="{48A87A34-81AB-432B-8DAE-1953F412C126}" type="datetimeFigureOut">
               <a:rPr lang="en-US" smtClean="0"/>
-              <a:t>2/16/2021</a:t>
+              <a:t>2/20/2021</a:t>
             </a:fld>
             <a:endParaRPr lang="en-US" dirty="0"/>
           </a:p>
@@ -4855,7 +4855,7 @@
           <a:p>
             <a:fld id="{48A87A34-81AB-432B-8DAE-1953F412C126}" type="datetimeFigureOut">
               <a:rPr lang="en-US" smtClean="0"/>
-              <a:t>2/16/2021</a:t>
+              <a:t>2/20/2021</a:t>
             </a:fld>
             <a:endParaRPr lang="en-US" dirty="0"/>
           </a:p>
@@ -5113,7 +5113,7 @@
             <a:fld id="{48A87A34-81AB-432B-8DAE-1953F412C126}" type="datetimeFigureOut">
               <a:rPr lang="en-US" smtClean="0"/>
               <a:pPr/>
-              <a:t>2/16/2021</a:t>
+              <a:t>2/20/2021</a:t>
             </a:fld>
             <a:endParaRPr lang="en-US" dirty="0"/>
           </a:p>
@@ -5357,7 +5357,7 @@
             <a:fld id="{48A87A34-81AB-432B-8DAE-1953F412C126}" type="datetimeFigureOut">
               <a:rPr lang="en-US" smtClean="0"/>
               <a:pPr/>
-              <a:t>2/16/2021</a:t>
+              <a:t>2/20/2021</a:t>
             </a:fld>
             <a:endParaRPr lang="en-US" dirty="0"/>
           </a:p>
@@ -6128,6 +6128,20 @@
           <a:p>
             <a:r>
               <a:rPr lang="en-GB" dirty="0"/>
+              <a:t>Import </a:t>
+            </a:r>
+            <a:r>
+              <a:rPr lang="en-GB" dirty="0" err="1"/>
+              <a:t>fra</a:t>
+            </a:r>
+            <a:r>
+              <a:rPr lang="en-GB" dirty="0"/>
+              <a:t> schematic</a:t>
+            </a:r>
+          </a:p>
+          <a:p>
+            <a:r>
+              <a:rPr lang="en-GB" dirty="0"/>
               <a:t>Footprint /</a:t>
             </a:r>
             <a:r>
@@ -6139,33 +6153,7 @@
           <a:p>
             <a:r>
               <a:rPr lang="en-GB" dirty="0"/>
-              <a:t>Import </a:t>
-            </a:r>
-            <a:r>
-              <a:rPr lang="en-GB" dirty="0" err="1"/>
-              <a:t>fra</a:t>
-            </a:r>
-            <a:r>
-              <a:rPr lang="en-GB" dirty="0"/>
-              <a:t> schematic</a:t>
-            </a:r>
-          </a:p>
-          <a:p>
-            <a:r>
-              <a:rPr lang="en-GB" dirty="0" err="1"/>
-              <a:t>Routning</a:t>
-            </a:r>
-            <a:r>
-              <a:rPr lang="en-GB" dirty="0"/>
-              <a:t> </a:t>
-            </a:r>
-            <a:r>
-              <a:rPr lang="en-GB" dirty="0" err="1"/>
-              <a:t>af</a:t>
-            </a:r>
-            <a:r>
-              <a:rPr lang="en-GB" dirty="0"/>
-              <a:t> </a:t>
+              <a:t>Routing af </a:t>
             </a:r>
             <a:r>
               <a:rPr lang="en-GB" dirty="0" err="1"/>
@@ -6254,7 +6242,7 @@
           <p:cNvPr id="2" name="Titel 1">
             <a:extLst>
               <a:ext uri="{FF2B5EF4-FFF2-40B4-BE49-F238E27FC236}">
-                <a16:creationId xmlns:a16="http://schemas.microsoft.com/office/drawing/2014/main" id="{72C7E04C-8006-4CD3-A66A-2357699CE722}"/>
+                <a16:creationId xmlns:a16="http://schemas.microsoft.com/office/drawing/2014/main" id="{6901D416-7CA9-499D-A657-6E40A14CAFE8}"/>
               </a:ext>
             </a:extLst>
           </p:cNvPr>
@@ -6272,7 +6260,15 @@
           <a:p>
             <a:r>
               <a:rPr lang="en-GB" dirty="0"/>
-              <a:t>Footprint</a:t>
+              <a:t>Import </a:t>
+            </a:r>
+            <a:r>
+              <a:rPr lang="en-GB" dirty="0" err="1"/>
+              <a:t>fra</a:t>
+            </a:r>
+            <a:r>
+              <a:rPr lang="en-GB" dirty="0"/>
+              <a:t> schematic</a:t>
             </a:r>
             <a:endParaRPr lang="LID4096" dirty="0"/>
           </a:p>
@@ -6283,7 +6279,7 @@
           <p:cNvPr id="3" name="Pladsholder til indhold 2">
             <a:extLst>
               <a:ext uri="{FF2B5EF4-FFF2-40B4-BE49-F238E27FC236}">
-                <a16:creationId xmlns:a16="http://schemas.microsoft.com/office/drawing/2014/main" id="{06C059E5-6769-4D27-AEA8-795B5A29D754}"/>
+                <a16:creationId xmlns:a16="http://schemas.microsoft.com/office/drawing/2014/main" id="{D82F42B5-0D54-4A72-93B6-D4C414B4994F}"/>
               </a:ext>
             </a:extLst>
           </p:cNvPr>
@@ -6301,7 +6297,21 @@
           <a:p>
             <a:r>
               <a:rPr lang="en-GB" dirty="0"/>
-              <a:t>Outline</a:t>
+              <a:t>Placement</a:t>
+            </a:r>
+          </a:p>
+          <a:p>
+            <a:r>
+              <a:rPr lang="en-GB" dirty="0"/>
+              <a:t>Check </a:t>
+            </a:r>
+            <a:r>
+              <a:rPr lang="en-GB" dirty="0" err="1"/>
+              <a:t>af</a:t>
+            </a:r>
+            <a:r>
+              <a:rPr lang="en-GB" dirty="0"/>
+              <a:t> footprint</a:t>
             </a:r>
           </a:p>
           <a:p>
@@ -6314,7 +6324,7 @@
           <p:cNvPr id="5" name="Billede 4">
             <a:extLst>
               <a:ext uri="{FF2B5EF4-FFF2-40B4-BE49-F238E27FC236}">
-                <a16:creationId xmlns:a16="http://schemas.microsoft.com/office/drawing/2014/main" id="{EC1C6006-988F-4C21-B1C7-558854E89828}"/>
+                <a16:creationId xmlns:a16="http://schemas.microsoft.com/office/drawing/2014/main" id="{66F5A1F8-28FD-4E3A-8DF1-3B53105CE27B}"/>
               </a:ext>
             </a:extLst>
           </p:cNvPr>
@@ -6331,8 +6341,8 @@
         </p:blipFill>
         <p:spPr>
           <a:xfrm>
-            <a:off x="4988708" y="2275583"/>
-            <a:ext cx="6856051" cy="4265525"/>
+            <a:off x="5560142" y="1718652"/>
+            <a:ext cx="6394123" cy="4975939"/>
           </a:xfrm>
           <a:prstGeom prst="rect">
             <a:avLst/>
@@ -6342,7 +6352,7 @@
     </p:spTree>
     <p:extLst>
       <p:ext uri="{BB962C8B-B14F-4D97-AF65-F5344CB8AC3E}">
-        <p14:creationId xmlns:p14="http://schemas.microsoft.com/office/powerpoint/2010/main" val="2376380929"/>
+        <p14:creationId xmlns:p14="http://schemas.microsoft.com/office/powerpoint/2010/main" val="3497227837"/>
       </p:ext>
     </p:extLst>
   </p:cSld>
@@ -6374,7 +6384,7 @@
           <p:cNvPr id="2" name="Titel 1">
             <a:extLst>
               <a:ext uri="{FF2B5EF4-FFF2-40B4-BE49-F238E27FC236}">
-                <a16:creationId xmlns:a16="http://schemas.microsoft.com/office/drawing/2014/main" id="{90FC6404-4EFD-4A53-99BE-341E4572A41C}"/>
+                <a16:creationId xmlns:a16="http://schemas.microsoft.com/office/drawing/2014/main" id="{72C7E04C-8006-4CD3-A66A-2357699CE722}"/>
               </a:ext>
             </a:extLst>
           </p:cNvPr>
@@ -6391,8 +6401,8 @@
           <a:lstStyle/>
           <a:p>
             <a:r>
-              <a:rPr lang="en-GB" dirty="0" err="1"/>
-              <a:t>Padstack</a:t>
+              <a:rPr lang="en-GB" dirty="0"/>
+              <a:t>Footprint</a:t>
             </a:r>
             <a:endParaRPr lang="LID4096" dirty="0"/>
           </a:p>
@@ -6403,7 +6413,7 @@
           <p:cNvPr id="3" name="Pladsholder til indhold 2">
             <a:extLst>
               <a:ext uri="{FF2B5EF4-FFF2-40B4-BE49-F238E27FC236}">
-                <a16:creationId xmlns:a16="http://schemas.microsoft.com/office/drawing/2014/main" id="{6BC3B2B1-B323-494F-9736-6F831D13D32D}"/>
+                <a16:creationId xmlns:a16="http://schemas.microsoft.com/office/drawing/2014/main" id="{06C059E5-6769-4D27-AEA8-795B5A29D754}"/>
               </a:ext>
             </a:extLst>
           </p:cNvPr>
@@ -6421,30 +6431,20 @@
           <a:p>
             <a:r>
               <a:rPr lang="en-GB" dirty="0"/>
-              <a:t>Shape</a:t>
-            </a:r>
-          </a:p>
-          <a:p>
-            <a:r>
-              <a:rPr lang="en-GB" dirty="0"/>
-              <a:t>Type</a:t>
-            </a:r>
-          </a:p>
-          <a:p>
-            <a:r>
-              <a:rPr lang="en-GB" dirty="0" err="1"/>
-              <a:t>Silkemask</a:t>
-            </a:r>
+              <a:t>Outline</a:t>
+            </a:r>
+          </a:p>
+          <a:p>
             <a:endParaRPr lang="LID4096" dirty="0"/>
           </a:p>
         </p:txBody>
       </p:sp>
       <p:pic>
         <p:nvPicPr>
-          <p:cNvPr id="9" name="Billede 8">
+          <p:cNvPr id="5" name="Billede 4">
             <a:extLst>
               <a:ext uri="{FF2B5EF4-FFF2-40B4-BE49-F238E27FC236}">
-                <a16:creationId xmlns:a16="http://schemas.microsoft.com/office/drawing/2014/main" id="{567512F3-1813-4425-8DFA-C5FCB2B897C1}"/>
+                <a16:creationId xmlns:a16="http://schemas.microsoft.com/office/drawing/2014/main" id="{EC1C6006-988F-4C21-B1C7-558854E89828}"/>
               </a:ext>
             </a:extLst>
           </p:cNvPr>
@@ -6461,8 +6461,8 @@
         </p:blipFill>
         <p:spPr>
           <a:xfrm>
-            <a:off x="6377484" y="3277056"/>
-            <a:ext cx="5497008" cy="3047088"/>
+            <a:off x="4988708" y="2275583"/>
+            <a:ext cx="6856051" cy="4265525"/>
           </a:xfrm>
           <a:prstGeom prst="rect">
             <a:avLst/>
@@ -6472,7 +6472,7 @@
     </p:spTree>
     <p:extLst>
       <p:ext uri="{BB962C8B-B14F-4D97-AF65-F5344CB8AC3E}">
-        <p14:creationId xmlns:p14="http://schemas.microsoft.com/office/powerpoint/2010/main" val="3867261761"/>
+        <p14:creationId xmlns:p14="http://schemas.microsoft.com/office/powerpoint/2010/main" val="2376380929"/>
       </p:ext>
     </p:extLst>
   </p:cSld>
@@ -6504,7 +6504,7 @@
           <p:cNvPr id="2" name="Titel 1">
             <a:extLst>
               <a:ext uri="{FF2B5EF4-FFF2-40B4-BE49-F238E27FC236}">
-                <a16:creationId xmlns:a16="http://schemas.microsoft.com/office/drawing/2014/main" id="{6901D416-7CA9-499D-A657-6E40A14CAFE8}"/>
+                <a16:creationId xmlns:a16="http://schemas.microsoft.com/office/drawing/2014/main" id="{90FC6404-4EFD-4A53-99BE-341E4572A41C}"/>
               </a:ext>
             </a:extLst>
           </p:cNvPr>
@@ -6521,16 +6521,8 @@
           <a:lstStyle/>
           <a:p>
             <a:r>
-              <a:rPr lang="en-GB" dirty="0"/>
-              <a:t>Import </a:t>
-            </a:r>
-            <a:r>
               <a:rPr lang="en-GB" dirty="0" err="1"/>
-              <a:t>fra</a:t>
-            </a:r>
-            <a:r>
-              <a:rPr lang="en-GB" dirty="0"/>
-              <a:t> schematic</a:t>
+              <a:t>Padstack</a:t>
             </a:r>
             <a:endParaRPr lang="LID4096" dirty="0"/>
           </a:p>
@@ -6541,7 +6533,7 @@
           <p:cNvPr id="3" name="Pladsholder til indhold 2">
             <a:extLst>
               <a:ext uri="{FF2B5EF4-FFF2-40B4-BE49-F238E27FC236}">
-                <a16:creationId xmlns:a16="http://schemas.microsoft.com/office/drawing/2014/main" id="{D82F42B5-0D54-4A72-93B6-D4C414B4994F}"/>
+                <a16:creationId xmlns:a16="http://schemas.microsoft.com/office/drawing/2014/main" id="{6BC3B2B1-B323-494F-9736-6F831D13D32D}"/>
               </a:ext>
             </a:extLst>
           </p:cNvPr>
@@ -6559,32 +6551,58 @@
           <a:p>
             <a:r>
               <a:rPr lang="en-GB" dirty="0"/>
-              <a:t>Placement</a:t>
+              <a:t>Shape</a:t>
             </a:r>
           </a:p>
           <a:p>
             <a:r>
               <a:rPr lang="en-GB" dirty="0"/>
-              <a:t>Check </a:t>
-            </a:r>
+              <a:t>Type</a:t>
+            </a:r>
+          </a:p>
+          <a:p>
             <a:r>
               <a:rPr lang="en-GB" dirty="0" err="1"/>
-              <a:t>af</a:t>
-            </a:r>
-            <a:r>
-              <a:rPr lang="en-GB" dirty="0"/>
-              <a:t> footprint</a:t>
-            </a:r>
-          </a:p>
-          <a:p>
+              <a:t>Silkemask</a:t>
+            </a:r>
             <a:endParaRPr lang="LID4096" dirty="0"/>
           </a:p>
         </p:txBody>
       </p:sp>
+      <p:pic>
+        <p:nvPicPr>
+          <p:cNvPr id="9" name="Billede 8">
+            <a:extLst>
+              <a:ext uri="{FF2B5EF4-FFF2-40B4-BE49-F238E27FC236}">
+                <a16:creationId xmlns:a16="http://schemas.microsoft.com/office/drawing/2014/main" id="{567512F3-1813-4425-8DFA-C5FCB2B897C1}"/>
+              </a:ext>
+            </a:extLst>
+          </p:cNvPr>
+          <p:cNvPicPr>
+            <a:picLocks noChangeAspect="1"/>
+          </p:cNvPicPr>
+          <p:nvPr/>
+        </p:nvPicPr>
+        <p:blipFill>
+          <a:blip r:embed="rId2"/>
+          <a:stretch>
+            <a:fillRect/>
+          </a:stretch>
+        </p:blipFill>
+        <p:spPr>
+          <a:xfrm>
+            <a:off x="6377484" y="3277056"/>
+            <a:ext cx="5497008" cy="3047088"/>
+          </a:xfrm>
+          <a:prstGeom prst="rect">
+            <a:avLst/>
+          </a:prstGeom>
+        </p:spPr>
+      </p:pic>
     </p:spTree>
     <p:extLst>
       <p:ext uri="{BB962C8B-B14F-4D97-AF65-F5344CB8AC3E}">
-        <p14:creationId xmlns:p14="http://schemas.microsoft.com/office/powerpoint/2010/main" val="3497227837"/>
+        <p14:creationId xmlns:p14="http://schemas.microsoft.com/office/powerpoint/2010/main" val="3867261761"/>
       </p:ext>
     </p:extLst>
   </p:cSld>

</xml_diff>